<commit_message>
Ajustes a la arquitectura de la infraestructura
</commit_message>
<xml_diff>
--- a/scm/arquitectura_infraestructura_desarrollo.pptx
+++ b/scm/arquitectura_infraestructura_desarrollo.pptx
@@ -3040,6 +3040,104 @@
             <p:ph type="sldImg"/>
           </p:nvPr>
         </p:nvSpPr>
+        <p:spPr/>
+      </p:sp>
+      <p:sp>
+        <p:nvSpPr>
+          <p:cNvPr id="3" name="Marcador de notas 2"/>
+          <p:cNvSpPr>
+            <a:spLocks noGrp="1"/>
+          </p:cNvSpPr>
+          <p:nvPr>
+            <p:ph type="body" idx="1"/>
+          </p:nvPr>
+        </p:nvSpPr>
+        <p:spPr/>
+        <p:txBody>
+          <a:bodyPr/>
+          <a:lstStyle/>
+          <a:p>
+            <a:r>
+              <a:rPr lang="es-ES" dirty="0" smtClean="0"/>
+              <a:t>rpm -i MySQL-server-</a:t>
+            </a:r>
+            <a:r>
+              <a:rPr lang="es-ES" b="1" i="1" dirty="0" smtClean="0">
+                <a:effectLst/>
+              </a:rPr>
+              <a:t>VERSION</a:t>
+            </a:r>
+            <a:r>
+              <a:rPr lang="es-ES" dirty="0" smtClean="0"/>
+              <a:t>.i386.rpm</a:t>
+            </a:r>
+            <a:endParaRPr lang="es-ES" dirty="0"/>
+          </a:p>
+        </p:txBody>
+      </p:sp>
+      <p:sp>
+        <p:nvSpPr>
+          <p:cNvPr id="4" name="Marcador de número de diapositiva 3"/>
+          <p:cNvSpPr>
+            <a:spLocks noGrp="1"/>
+          </p:cNvSpPr>
+          <p:nvPr>
+            <p:ph type="sldNum" sz="quarter" idx="10"/>
+          </p:nvPr>
+        </p:nvSpPr>
+        <p:spPr/>
+        <p:txBody>
+          <a:bodyPr/>
+          <a:lstStyle/>
+          <a:p>
+            <a:fld id="{A755A953-2BD7-463B-8A56-4A00D775E979}" type="slidenum">
+              <a:rPr lang="es-ES" smtClean="0"/>
+              <a:t>2</a:t>
+            </a:fld>
+            <a:endParaRPr lang="es-ES"/>
+          </a:p>
+        </p:txBody>
+      </p:sp>
+    </p:spTree>
+    <p:extLst>
+      <p:ext uri="{BB962C8B-B14F-4D97-AF65-F5344CB8AC3E}">
+        <p14:creationId xmlns:p14="http://schemas.microsoft.com/office/powerpoint/2010/main" val="2569149935"/>
+      </p:ext>
+    </p:extLst>
+  </p:cSld>
+  <p:clrMapOvr>
+    <a:masterClrMapping/>
+  </p:clrMapOvr>
+</p:notes>
+</file>
+
+<file path=ppt/notesSlides/notesSlide2.xml><?xml version="1.0" encoding="utf-8"?>
+<p:notes xmlns:a="http://schemas.openxmlformats.org/drawingml/2006/main" xmlns:r="http://schemas.openxmlformats.org/officeDocument/2006/relationships" xmlns:p="http://schemas.openxmlformats.org/presentationml/2006/main">
+  <p:cSld>
+    <p:spTree>
+      <p:nvGrpSpPr>
+        <p:cNvPr id="1" name=""/>
+        <p:cNvGrpSpPr/>
+        <p:nvPr/>
+      </p:nvGrpSpPr>
+      <p:grpSpPr>
+        <a:xfrm>
+          <a:off x="0" y="0"/>
+          <a:ext cx="0" cy="0"/>
+          <a:chOff x="0" y="0"/>
+          <a:chExt cx="0" cy="0"/>
+        </a:xfrm>
+      </p:grpSpPr>
+      <p:sp>
+        <p:nvSpPr>
+          <p:cNvPr id="2" name="Marcador de imagen de diapositiva 1"/>
+          <p:cNvSpPr>
+            <a:spLocks noGrp="1" noRot="1" noChangeAspect="1"/>
+          </p:cNvSpPr>
+          <p:nvPr>
+            <p:ph type="sldImg"/>
+          </p:nvPr>
+        </p:nvSpPr>
         <p:spPr>
           <a:xfrm>
             <a:off x="685800" y="1143000"/>
@@ -6066,14 +6164,14 @@
             <p:ph idx="1"/>
             <p:extLst>
               <p:ext uri="{D42A27DB-BD31-4B8C-83A1-F6EECF244321}">
-                <p14:modId xmlns:p14="http://schemas.microsoft.com/office/powerpoint/2010/main" val="1019424663"/>
+                <p14:modId xmlns:p14="http://schemas.microsoft.com/office/powerpoint/2010/main" val="3636540411"/>
               </p:ext>
             </p:extLst>
           </p:nvPr>
         </p:nvGraphicFramePr>
         <p:xfrm>
           <a:off x="838200" y="1825625"/>
-          <a:ext cx="10515605" cy="3235960"/>
+          <a:ext cx="10515605" cy="4719320"/>
         </p:xfrm>
         <a:graphic>
           <a:graphicData uri="http://schemas.openxmlformats.org/drawingml/2006/table">
@@ -6141,8 +6239,16 @@
                     <a:lstStyle/>
                     <a:p>
                       <a:r>
+                        <a:rPr lang="es-ES" dirty="0" err="1" smtClean="0"/>
+                        <a:t>Comments</a:t>
+                      </a:r>
+                      <a:r>
                         <a:rPr lang="es-ES" dirty="0" smtClean="0"/>
-                        <a:t>Componente Software</a:t>
+                        <a:t> / </a:t>
+                      </a:r>
+                      <a:r>
+                        <a:rPr lang="es-ES" dirty="0" err="1" smtClean="0"/>
+                        <a:t>References</a:t>
                       </a:r>
                       <a:endParaRPr lang="es-ES" dirty="0"/>
                     </a:p>
@@ -6243,6 +6349,10 @@
                     <a:lstStyle/>
                     <a:p>
                       <a:pPr algn="ctr"/>
+                      <a:r>
+                        <a:rPr lang="es-ES" dirty="0" smtClean="0"/>
+                        <a:t>5.6.20</a:t>
+                      </a:r>
                       <a:endParaRPr lang="es-ES" dirty="0"/>
                     </a:p>
                   </a:txBody>
@@ -6253,6 +6363,10 @@
                     <a:bodyPr/>
                     <a:lstStyle/>
                     <a:p>
+                      <a:r>
+                        <a:rPr lang="es-ES" dirty="0" smtClean="0"/>
+                        <a:t>http://dev.mysql.com/downloads/file.php?id=453278</a:t>
+                      </a:r>
                       <a:endParaRPr lang="es-ES" dirty="0"/>
                     </a:p>
                   </a:txBody>
@@ -6553,10 +6667,89 @@
                     <a:p>
                       <a:r>
                         <a:rPr lang="es-ES" dirty="0" smtClean="0">
-                          <a:hlinkClick r:id="rId2"/>
+                          <a:hlinkClick r:id="rId3"/>
                         </a:rPr>
                         <a:t>http://hudson-ci.org/downloads/redhat/hudson-3.2.0-1.1.noarch.rpm</a:t>
                       </a:r>
+                      <a:endParaRPr lang="es-ES" dirty="0"/>
+                    </a:p>
+                  </a:txBody>
+                  <a:tcPr/>
+                </a:tc>
+              </a:tr>
+              <a:tr h="370840">
+                <a:tc>
+                  <a:txBody>
+                    <a:bodyPr/>
+                    <a:lstStyle/>
+                    <a:p>
+                      <a:r>
+                        <a:rPr lang="es-ES" dirty="0" smtClean="0"/>
+                        <a:t>tstsvr01</a:t>
+                      </a:r>
+                      <a:endParaRPr lang="es-ES" dirty="0"/>
+                    </a:p>
+                  </a:txBody>
+                  <a:tcPr/>
+                </a:tc>
+                <a:tc>
+                  <a:txBody>
+                    <a:bodyPr/>
+                    <a:lstStyle/>
+                    <a:p>
+                      <a:pPr marL="0" marR="0" indent="0" algn="l" defTabSz="914400" rtl="0" eaLnBrk="1" fontAlgn="auto" latinLnBrk="0" hangingPunct="1">
+                        <a:lnSpc>
+                          <a:spcPct val="100000"/>
+                        </a:lnSpc>
+                        <a:spcBef>
+                          <a:spcPts val="0"/>
+                        </a:spcBef>
+                        <a:spcAft>
+                          <a:spcPts val="0"/>
+                        </a:spcAft>
+                        <a:buClrTx/>
+                        <a:buSzTx/>
+                        <a:buFontTx/>
+                        <a:buNone/>
+                        <a:tabLst/>
+                        <a:defRPr/>
+                      </a:pPr>
+                      <a:r>
+                        <a:rPr lang="es-ES" dirty="0" smtClean="0"/>
+                        <a:t>Oracle Enterprise</a:t>
+                      </a:r>
+                      <a:r>
+                        <a:rPr lang="es-ES" baseline="0" dirty="0" smtClean="0"/>
+                        <a:t> </a:t>
+                      </a:r>
+                      <a:r>
+                        <a:rPr lang="es-ES" dirty="0" smtClean="0"/>
+                        <a:t>Linux</a:t>
+                      </a:r>
+                    </a:p>
+                  </a:txBody>
+                  <a:tcPr/>
+                </a:tc>
+                <a:tc>
+                  <a:txBody>
+                    <a:bodyPr/>
+                    <a:lstStyle/>
+                    <a:p>
+                      <a:pPr algn="ctr"/>
+                      <a:r>
+                        <a:rPr lang="es-ES" dirty="0" smtClean="0"/>
+                        <a:t>6.4</a:t>
+                      </a:r>
+                      <a:endParaRPr lang="es-ES" dirty="0"/>
+                    </a:p>
+                  </a:txBody>
+                  <a:tcPr/>
+                </a:tc>
+                <a:tc>
+                  <a:txBody>
+                    <a:bodyPr/>
+                    <a:lstStyle/>
+                    <a:p>
                       <a:endParaRPr lang="es-ES" dirty="0"/>
                     </a:p>
                   </a:txBody>
@@ -6596,6 +6789,148 @@
                         <a:tabLst/>
                         <a:defRPr/>
                       </a:pPr>
+                      <a:r>
+                        <a:rPr lang="es-ES" dirty="0" err="1" smtClean="0"/>
+                        <a:t>Selenium</a:t>
+                      </a:r>
+                      <a:r>
+                        <a:rPr lang="es-ES" dirty="0" smtClean="0"/>
+                        <a:t> HQ</a:t>
+                      </a:r>
+                    </a:p>
+                  </a:txBody>
+                  <a:tcPr/>
+                </a:tc>
+                <a:tc>
+                  <a:txBody>
+                    <a:bodyPr/>
+                    <a:lstStyle/>
+                    <a:p>
+                      <a:pPr algn="ctr"/>
+                      <a:endParaRPr lang="es-ES" dirty="0"/>
+                    </a:p>
+                  </a:txBody>
+                  <a:tcPr/>
+                </a:tc>
+                <a:tc>
+                  <a:txBody>
+                    <a:bodyPr/>
+                    <a:lstStyle/>
+                    <a:p>
+                      <a:endParaRPr lang="es-ES" dirty="0"/>
+                    </a:p>
+                  </a:txBody>
+                  <a:tcPr/>
+                </a:tc>
+              </a:tr>
+              <a:tr h="370840">
+                <a:tc>
+                  <a:txBody>
+                    <a:bodyPr/>
+                    <a:lstStyle/>
+                    <a:p>
+                      <a:endParaRPr lang="es-ES" dirty="0"/>
+                    </a:p>
+                  </a:txBody>
+                  <a:tcPr/>
+                </a:tc>
+                <a:tc>
+                  <a:txBody>
+                    <a:bodyPr/>
+                    <a:lstStyle/>
+                    <a:p>
+                      <a:pPr marL="0" marR="0" indent="0" algn="l" defTabSz="914400" rtl="0" eaLnBrk="1" fontAlgn="auto" latinLnBrk="0" hangingPunct="1">
+                        <a:lnSpc>
+                          <a:spcPct val="100000"/>
+                        </a:lnSpc>
+                        <a:spcBef>
+                          <a:spcPts val="0"/>
+                        </a:spcBef>
+                        <a:spcAft>
+                          <a:spcPts val="0"/>
+                        </a:spcAft>
+                        <a:buClrTx/>
+                        <a:buSzTx/>
+                        <a:buFontTx/>
+                        <a:buNone/>
+                        <a:tabLst/>
+                        <a:defRPr/>
+                      </a:pPr>
+                      <a:r>
+                        <a:rPr lang="es-ES" dirty="0" smtClean="0"/>
+                        <a:t>Test Link</a:t>
+                      </a:r>
+                    </a:p>
+                  </a:txBody>
+                  <a:tcPr/>
+                </a:tc>
+                <a:tc>
+                  <a:txBody>
+                    <a:bodyPr/>
+                    <a:lstStyle/>
+                    <a:p>
+                      <a:pPr algn="ctr"/>
+                      <a:endParaRPr lang="es-ES" dirty="0"/>
+                    </a:p>
+                  </a:txBody>
+                  <a:tcPr/>
+                </a:tc>
+                <a:tc>
+                  <a:txBody>
+                    <a:bodyPr/>
+                    <a:lstStyle/>
+                    <a:p>
+                      <a:endParaRPr lang="es-ES" dirty="0"/>
+                    </a:p>
+                  </a:txBody>
+                  <a:tcPr/>
+                </a:tc>
+              </a:tr>
+              <a:tr h="370840">
+                <a:tc>
+                  <a:txBody>
+                    <a:bodyPr/>
+                    <a:lstStyle/>
+                    <a:p>
+                      <a:r>
+                        <a:rPr lang="es-ES" dirty="0" err="1" smtClean="0"/>
+                        <a:t>Dev_PC</a:t>
+                      </a:r>
+                      <a:endParaRPr lang="es-ES" dirty="0"/>
+                    </a:p>
+                  </a:txBody>
+                  <a:tcPr/>
+                </a:tc>
+                <a:tc>
+                  <a:txBody>
+                    <a:bodyPr/>
+                    <a:lstStyle/>
+                    <a:p>
+                      <a:pPr marL="0" marR="0" indent="0" algn="l" defTabSz="914400" rtl="0" eaLnBrk="1" fontAlgn="auto" latinLnBrk="0" hangingPunct="1">
+                        <a:lnSpc>
+                          <a:spcPct val="100000"/>
+                        </a:lnSpc>
+                        <a:spcBef>
+                          <a:spcPts val="0"/>
+                        </a:spcBef>
+                        <a:spcAft>
+                          <a:spcPts val="0"/>
+                        </a:spcAft>
+                        <a:buClrTx/>
+                        <a:buSzTx/>
+                        <a:buFontTx/>
+                        <a:buNone/>
+                        <a:tabLst/>
+                        <a:defRPr/>
+                      </a:pPr>
+                      <a:r>
+                        <a:rPr lang="es-ES" dirty="0" smtClean="0"/>
+                        <a:t>Oracle </a:t>
+                      </a:r>
+                      <a:r>
+                        <a:rPr lang="es-ES" dirty="0" err="1" smtClean="0"/>
+                        <a:t>NetBeans</a:t>
+                      </a:r>
                       <a:endParaRPr lang="es-ES" dirty="0" smtClean="0"/>
                     </a:p>
                   </a:txBody>
@@ -6607,6 +6942,78 @@
                     <a:lstStyle/>
                     <a:p>
                       <a:pPr algn="ctr"/>
+                      <a:r>
+                        <a:rPr lang="es-ES" dirty="0" smtClean="0"/>
+                        <a:t>7.4</a:t>
+                      </a:r>
+                      <a:endParaRPr lang="es-ES" dirty="0"/>
+                    </a:p>
+                  </a:txBody>
+                  <a:tcPr/>
+                </a:tc>
+                <a:tc>
+                  <a:txBody>
+                    <a:bodyPr/>
+                    <a:lstStyle/>
+                    <a:p>
+                      <a:endParaRPr lang="es-ES" dirty="0"/>
+                    </a:p>
+                  </a:txBody>
+                  <a:tcPr/>
+                </a:tc>
+              </a:tr>
+              <a:tr h="370840">
+                <a:tc>
+                  <a:txBody>
+                    <a:bodyPr/>
+                    <a:lstStyle/>
+                    <a:p>
+                      <a:endParaRPr lang="es-ES" dirty="0"/>
+                    </a:p>
+                  </a:txBody>
+                  <a:tcPr/>
+                </a:tc>
+                <a:tc>
+                  <a:txBody>
+                    <a:bodyPr/>
+                    <a:lstStyle/>
+                    <a:p>
+                      <a:pPr marL="0" marR="0" indent="0" algn="l" defTabSz="914400" rtl="0" eaLnBrk="1" fontAlgn="auto" latinLnBrk="0" hangingPunct="1">
+                        <a:lnSpc>
+                          <a:spcPct val="100000"/>
+                        </a:lnSpc>
+                        <a:spcBef>
+                          <a:spcPts val="0"/>
+                        </a:spcBef>
+                        <a:spcAft>
+                          <a:spcPts val="0"/>
+                        </a:spcAft>
+                        <a:buClrTx/>
+                        <a:buSzTx/>
+                        <a:buFontTx/>
+                        <a:buNone/>
+                        <a:tabLst/>
+                        <a:defRPr/>
+                      </a:pPr>
+                      <a:r>
+                        <a:rPr lang="es-ES" dirty="0" err="1" smtClean="0"/>
+                        <a:t>SourceTree</a:t>
+                      </a:r>
+                      <a:endParaRPr lang="es-ES" dirty="0" smtClean="0"/>
+                    </a:p>
+                  </a:txBody>
+                  <a:tcPr/>
+                </a:tc>
+                <a:tc>
+                  <a:txBody>
+                    <a:bodyPr/>
+                    <a:lstStyle/>
+                    <a:p>
+                      <a:pPr algn="ctr"/>
+                      <a:r>
+                        <a:rPr lang="es-ES" dirty="0" smtClean="0"/>
+                        <a:t>1.6.3.0</a:t>
+                      </a:r>
                       <a:endParaRPr lang="es-ES" dirty="0"/>
                     </a:p>
                   </a:txBody>

</xml_diff>